<commit_message>
Update ppt & enhance compare
</commit_message>
<xml_diff>
--- a/Golang.pptx
+++ b/Golang.pptx
@@ -3951,6 +3951,9 @@
   <p:clrMapOvr>
     <a:masterClrMapping/>
   </p:clrMapOvr>
+  <p:transition spd="slow">
+    <p:push dir="u"/>
+  </p:transition>
 </p:sld>
 </file>
 
@@ -4088,10 +4091,9 @@
           <a:p>
             <a:pPr lvl="1"/>
             <a:r>
-              <a:rPr lang="en-BE" dirty="0" err="1"/>
-              <a:t>Fibonnaci</a:t>
-            </a:r>
-            <a:endParaRPr lang="en-BE" dirty="0"/>
+              <a:rPr lang="en-BE" dirty="0"/>
+              <a:t>Fibonacci</a:t>
+            </a:r>
           </a:p>
           <a:p>
             <a:pPr lvl="1"/>
@@ -4111,6 +4113,66 @@
           </a:p>
         </p:txBody>
       </p:sp>
+      <p:pic>
+        <p:nvPicPr>
+          <p:cNvPr id="6" name="Afbeelding 5">
+            <a:extLst>
+              <a:ext uri="{FF2B5EF4-FFF2-40B4-BE49-F238E27FC236}">
+                <a16:creationId xmlns:a16="http://schemas.microsoft.com/office/drawing/2014/main" id="{2366E251-6B77-9040-544C-EED679496600}"/>
+              </a:ext>
+            </a:extLst>
+          </p:cNvPr>
+          <p:cNvPicPr>
+            <a:picLocks noChangeAspect="1"/>
+          </p:cNvPicPr>
+          <p:nvPr/>
+        </p:nvPicPr>
+        <p:blipFill>
+          <a:blip r:embed="rId4"/>
+          <a:stretch>
+            <a:fillRect/>
+          </a:stretch>
+        </p:blipFill>
+        <p:spPr>
+          <a:xfrm>
+            <a:off x="3631299" y="2536420"/>
+            <a:ext cx="8154972" cy="1632458"/>
+          </a:xfrm>
+          <a:prstGeom prst="rect">
+            <a:avLst/>
+          </a:prstGeom>
+        </p:spPr>
+      </p:pic>
+      <p:pic>
+        <p:nvPicPr>
+          <p:cNvPr id="8" name="Afbeelding 7">
+            <a:extLst>
+              <a:ext uri="{FF2B5EF4-FFF2-40B4-BE49-F238E27FC236}">
+                <a16:creationId xmlns:a16="http://schemas.microsoft.com/office/drawing/2014/main" id="{2B4E0A97-5B16-8F96-931C-6CB27F3D7EE6}"/>
+              </a:ext>
+            </a:extLst>
+          </p:cNvPr>
+          <p:cNvPicPr>
+            <a:picLocks noChangeAspect="1"/>
+          </p:cNvPicPr>
+          <p:nvPr/>
+        </p:nvPicPr>
+        <p:blipFill>
+          <a:blip r:embed="rId5"/>
+          <a:stretch>
+            <a:fillRect/>
+          </a:stretch>
+        </p:blipFill>
+        <p:spPr>
+          <a:xfrm>
+            <a:off x="3631299" y="4303815"/>
+            <a:ext cx="8154972" cy="1668890"/>
+          </a:xfrm>
+          <a:prstGeom prst="rect">
+            <a:avLst/>
+          </a:prstGeom>
+        </p:spPr>
+      </p:pic>
     </p:spTree>
     <p:extLst>
       <p:ext uri="{BB962C8B-B14F-4D97-AF65-F5344CB8AC3E}">
@@ -4385,10 +4447,10 @@
       </p:grpSpPr>
       <p:pic>
         <p:nvPicPr>
-          <p:cNvPr id="9" name="Tijdelijke aanduiding voor inhoud 4">
-            <a:extLst>
-              <a:ext uri="{FF2B5EF4-FFF2-40B4-BE49-F238E27FC236}">
-                <a16:creationId xmlns:a16="http://schemas.microsoft.com/office/drawing/2014/main" id="{1C7E6E36-6006-91F1-BA9C-C8237C5CBD51}"/>
+          <p:cNvPr id="4" name="Tijdelijke aanduiding voor inhoud 5">
+            <a:extLst>
+              <a:ext uri="{FF2B5EF4-FFF2-40B4-BE49-F238E27FC236}">
+                <a16:creationId xmlns:a16="http://schemas.microsoft.com/office/drawing/2014/main" id="{B01AF4B3-7A51-D5BD-2958-20827526D9CD}"/>
               </a:ext>
             </a:extLst>
           </p:cNvPr>
@@ -4441,10 +4503,18 @@
           <a:lstStyle/>
           <a:p>
             <a:r>
-              <a:rPr lang="en-BE" b="1" dirty="0" err="1"/>
+              <a:rPr lang="en-BE" b="1" dirty="0" err="1">
+                <a:solidFill>
+                  <a:schemeClr val="bg1"/>
+                </a:solidFill>
+              </a:rPr>
               <a:t>Voordelen</a:t>
             </a:r>
-            <a:endParaRPr lang="nl-BE" b="1" dirty="0"/>
+            <a:endParaRPr lang="nl-BE" b="1" dirty="0">
+              <a:solidFill>
+                <a:schemeClr val="bg1"/>
+              </a:solidFill>
+            </a:endParaRPr>
           </a:p>
         </p:txBody>
       </p:sp>
@@ -4545,6 +4615,42 @@
           </a:p>
         </p:txBody>
       </p:sp>
+      <p:pic>
+        <p:nvPicPr>
+          <p:cNvPr id="10" name="Afbeelding 9" descr="Afbeelding met clipart, tekenfilm&#10;&#10;Automatisch gegenereerde beschrijving">
+            <a:extLst>
+              <a:ext uri="{FF2B5EF4-FFF2-40B4-BE49-F238E27FC236}">
+                <a16:creationId xmlns:a16="http://schemas.microsoft.com/office/drawing/2014/main" id="{91CF4FA6-C71E-DE07-A228-A609015C3A56}"/>
+              </a:ext>
+            </a:extLst>
+          </p:cNvPr>
+          <p:cNvPicPr>
+            <a:picLocks noChangeAspect="1"/>
+          </p:cNvPicPr>
+          <p:nvPr/>
+        </p:nvPicPr>
+        <p:blipFill>
+          <a:blip r:embed="rId4">
+            <a:extLst>
+              <a:ext uri="{28A0092B-C50C-407E-A947-70E740481C1C}">
+                <a14:useLocalDpi xmlns:a14="http://schemas.microsoft.com/office/drawing/2010/main" val="0"/>
+              </a:ext>
+            </a:extLst>
+          </a:blip>
+          <a:stretch>
+            <a:fillRect/>
+          </a:stretch>
+        </p:blipFill>
+        <p:spPr>
+          <a:xfrm>
+            <a:off x="6096000" y="2553542"/>
+            <a:ext cx="4077269" cy="3343742"/>
+          </a:xfrm>
+          <a:prstGeom prst="rect">
+            <a:avLst/>
+          </a:prstGeom>
+        </p:spPr>
+      </p:pic>
     </p:spTree>
     <p:extLst>
       <p:ext uri="{BB962C8B-B14F-4D97-AF65-F5344CB8AC3E}">
@@ -4580,10 +4686,10 @@
       </p:grpSpPr>
       <p:pic>
         <p:nvPicPr>
-          <p:cNvPr id="4" name="Tijdelijke aanduiding voor inhoud 5">
-            <a:extLst>
-              <a:ext uri="{FF2B5EF4-FFF2-40B4-BE49-F238E27FC236}">
-                <a16:creationId xmlns:a16="http://schemas.microsoft.com/office/drawing/2014/main" id="{B01AF4B3-7A51-D5BD-2958-20827526D9CD}"/>
+          <p:cNvPr id="9" name="Tijdelijke aanduiding voor inhoud 4">
+            <a:extLst>
+              <a:ext uri="{FF2B5EF4-FFF2-40B4-BE49-F238E27FC236}">
+                <a16:creationId xmlns:a16="http://schemas.microsoft.com/office/drawing/2014/main" id="{1C7E6E36-6006-91F1-BA9C-C8237C5CBD51}"/>
               </a:ext>
             </a:extLst>
           </p:cNvPr>
@@ -4636,18 +4742,10 @@
           <a:lstStyle/>
           <a:p>
             <a:r>
-              <a:rPr lang="en-BE" b="1" dirty="0" err="1">
-                <a:solidFill>
-                  <a:schemeClr val="bg1"/>
-                </a:solidFill>
-              </a:rPr>
+              <a:rPr lang="en-BE" b="1" dirty="0" err="1"/>
               <a:t>Nadelen</a:t>
             </a:r>
-            <a:endParaRPr lang="nl-BE" b="1" dirty="0">
-              <a:solidFill>
-                <a:schemeClr val="bg1"/>
-              </a:solidFill>
-            </a:endParaRPr>
+            <a:endParaRPr lang="nl-BE" b="1" dirty="0"/>
           </a:p>
         </p:txBody>
       </p:sp>
@@ -4739,11 +4837,11 @@
           <a:p>
             <a:r>
               <a:rPr lang="nl-NL" b="1" dirty="0"/>
-              <a:t>Minder </a:t>
+              <a:t>B</a:t>
             </a:r>
             <a:r>
               <a:rPr lang="en-BE" b="1" dirty="0" err="1"/>
-              <a:t>robuust</a:t>
+              <a:t>eperkt</a:t>
             </a:r>
             <a:r>
               <a:rPr lang="nl-NL" b="1" dirty="0"/>
@@ -4763,7 +4861,7 @@
             </a:r>
             <a:r>
               <a:rPr lang="en-BE" dirty="0"/>
-              <a:t> / Node</a:t>
+              <a:t> / NodeJS</a:t>
             </a:r>
           </a:p>
           <a:p>
@@ -4771,6 +4869,42 @@
           </a:p>
         </p:txBody>
       </p:sp>
+      <p:pic>
+        <p:nvPicPr>
+          <p:cNvPr id="5" name="Afbeelding 4" descr="Afbeelding met clipart, tekenfilm&#10;&#10;Automatisch gegenereerde beschrijving">
+            <a:extLst>
+              <a:ext uri="{FF2B5EF4-FFF2-40B4-BE49-F238E27FC236}">
+                <a16:creationId xmlns:a16="http://schemas.microsoft.com/office/drawing/2014/main" id="{55A420C0-11B1-1E0F-1D63-6EC7ECD3BFEB}"/>
+              </a:ext>
+            </a:extLst>
+          </p:cNvPr>
+          <p:cNvPicPr>
+            <a:picLocks noChangeAspect="1"/>
+          </p:cNvPicPr>
+          <p:nvPr/>
+        </p:nvPicPr>
+        <p:blipFill>
+          <a:blip r:embed="rId4">
+            <a:extLst>
+              <a:ext uri="{28A0092B-C50C-407E-A947-70E740481C1C}">
+                <a14:useLocalDpi xmlns:a14="http://schemas.microsoft.com/office/drawing/2010/main" val="0"/>
+              </a:ext>
+            </a:extLst>
+          </a:blip>
+          <a:stretch>
+            <a:fillRect/>
+          </a:stretch>
+        </p:blipFill>
+        <p:spPr>
+          <a:xfrm>
+            <a:off x="7194188" y="4642325"/>
+            <a:ext cx="3655009" cy="2033778"/>
+          </a:xfrm>
+          <a:prstGeom prst="rect">
+            <a:avLst/>
+          </a:prstGeom>
+        </p:spPr>
+      </p:pic>
     </p:spTree>
     <p:extLst>
       <p:ext uri="{BB962C8B-B14F-4D97-AF65-F5344CB8AC3E}">
@@ -4806,10 +4940,10 @@
       </p:grpSpPr>
       <p:pic>
         <p:nvPicPr>
-          <p:cNvPr id="4" name="Tijdelijke aanduiding voor inhoud 4">
-            <a:extLst>
-              <a:ext uri="{FF2B5EF4-FFF2-40B4-BE49-F238E27FC236}">
-                <a16:creationId xmlns:a16="http://schemas.microsoft.com/office/drawing/2014/main" id="{425E55F4-E02C-2C05-B286-C1C9D5DC3338}"/>
+          <p:cNvPr id="5" name="Tijdelijke aanduiding voor inhoud 5">
+            <a:extLst>
+              <a:ext uri="{FF2B5EF4-FFF2-40B4-BE49-F238E27FC236}">
+                <a16:creationId xmlns:a16="http://schemas.microsoft.com/office/drawing/2014/main" id="{F4A593FA-04B8-2A22-4DD8-7C90E0BD892D}"/>
               </a:ext>
             </a:extLst>
           </p:cNvPr>
@@ -4862,10 +4996,18 @@
           <a:lstStyle/>
           <a:p>
             <a:r>
-              <a:rPr lang="en-BE" b="1" dirty="0" err="1"/>
+              <a:rPr lang="en-BE" b="1" dirty="0" err="1">
+                <a:solidFill>
+                  <a:schemeClr val="bg1"/>
+                </a:solidFill>
+              </a:rPr>
               <a:t>Implementaties</a:t>
             </a:r>
-            <a:endParaRPr lang="nl-BE" b="1" dirty="0"/>
+            <a:endParaRPr lang="nl-BE" b="1" dirty="0">
+              <a:solidFill>
+                <a:schemeClr val="bg1"/>
+              </a:solidFill>
+            </a:endParaRPr>
           </a:p>
         </p:txBody>
       </p:sp>
@@ -4982,10 +5124,10 @@
       </p:grpSpPr>
       <p:pic>
         <p:nvPicPr>
-          <p:cNvPr id="4" name="Tijdelijke aanduiding voor inhoud 5">
-            <a:extLst>
-              <a:ext uri="{FF2B5EF4-FFF2-40B4-BE49-F238E27FC236}">
-                <a16:creationId xmlns:a16="http://schemas.microsoft.com/office/drawing/2014/main" id="{F4A593FA-04B8-2A22-4DD8-7C90E0BD892D}"/>
+          <p:cNvPr id="5" name="Tijdelijke aanduiding voor inhoud 4">
+            <a:extLst>
+              <a:ext uri="{FF2B5EF4-FFF2-40B4-BE49-F238E27FC236}">
+                <a16:creationId xmlns:a16="http://schemas.microsoft.com/office/drawing/2014/main" id="{425E55F4-E02C-2C05-B286-C1C9D5DC3338}"/>
               </a:ext>
             </a:extLst>
           </p:cNvPr>
@@ -5038,18 +5180,10 @@
           <a:lstStyle/>
           <a:p>
             <a:r>
-              <a:rPr lang="en-BE" b="1" dirty="0" err="1">
-                <a:solidFill>
-                  <a:schemeClr val="bg1"/>
-                </a:solidFill>
-              </a:rPr>
+              <a:rPr lang="en-BE" b="1" dirty="0" err="1"/>
               <a:t>Bedenkingen</a:t>
             </a:r>
-            <a:endParaRPr lang="nl-BE" b="1" dirty="0">
-              <a:solidFill>
-                <a:schemeClr val="bg1"/>
-              </a:solidFill>
-            </a:endParaRPr>
+            <a:endParaRPr lang="nl-BE" b="1" dirty="0"/>
           </a:p>
         </p:txBody>
       </p:sp>
@@ -5112,11 +5246,19 @@
             </a:r>
             <a:r>
               <a:rPr lang="en-BE" dirty="0" err="1"/>
-              <a:t>niet</a:t>
+              <a:t>schijnbaar</a:t>
             </a:r>
             <a:r>
               <a:rPr lang="en-BE" dirty="0"/>
-              <a:t> zo popular? (2009)</a:t>
+              <a:t> minder </a:t>
+            </a:r>
+            <a:r>
+              <a:rPr lang="en-BE" dirty="0" err="1"/>
+              <a:t>populair</a:t>
+            </a:r>
+            <a:r>
+              <a:rPr lang="en-BE" dirty="0"/>
+              <a:t>? (2009)</a:t>
             </a:r>
           </a:p>
           <a:p>
@@ -5124,6 +5266,42 @@
           </a:p>
         </p:txBody>
       </p:sp>
+      <p:pic>
+        <p:nvPicPr>
+          <p:cNvPr id="8" name="Afbeelding 7" descr="Afbeelding met clipart, tekening, illustratie, Kinderkunst&#10;&#10;Automatisch gegenereerde beschrijving">
+            <a:extLst>
+              <a:ext uri="{FF2B5EF4-FFF2-40B4-BE49-F238E27FC236}">
+                <a16:creationId xmlns:a16="http://schemas.microsoft.com/office/drawing/2014/main" id="{74F08AE5-CF5E-01E0-AC4D-862C9976196E}"/>
+              </a:ext>
+            </a:extLst>
+          </p:cNvPr>
+          <p:cNvPicPr>
+            <a:picLocks noChangeAspect="1"/>
+          </p:cNvPicPr>
+          <p:nvPr/>
+        </p:nvPicPr>
+        <p:blipFill>
+          <a:blip r:embed="rId4">
+            <a:extLst>
+              <a:ext uri="{28A0092B-C50C-407E-A947-70E740481C1C}">
+                <a14:useLocalDpi xmlns:a14="http://schemas.microsoft.com/office/drawing/2010/main" val="0"/>
+              </a:ext>
+            </a:extLst>
+          </a:blip>
+          <a:stretch>
+            <a:fillRect/>
+          </a:stretch>
+        </p:blipFill>
+        <p:spPr>
+          <a:xfrm>
+            <a:off x="6854879" y="756873"/>
+            <a:ext cx="2456269" cy="2896929"/>
+          </a:xfrm>
+          <a:prstGeom prst="rect">
+            <a:avLst/>
+          </a:prstGeom>
+        </p:spPr>
+      </p:pic>
     </p:spTree>
     <p:extLst>
       <p:ext uri="{BB962C8B-B14F-4D97-AF65-F5344CB8AC3E}">
@@ -5355,6 +5533,30 @@
               <a:rPr lang="en-BE" dirty="0" err="1"/>
               <a:t>compilen</a:t>
             </a:r>
+            <a:r>
+              <a:rPr lang="en-BE" dirty="0"/>
+              <a:t> </a:t>
+            </a:r>
+            <a:r>
+              <a:rPr lang="en-BE" dirty="0" err="1"/>
+              <a:t>voor</a:t>
+            </a:r>
+            <a:r>
+              <a:rPr lang="en-BE" dirty="0"/>
+              <a:t> </a:t>
+            </a:r>
+            <a:r>
+              <a:rPr lang="en-BE" dirty="0" err="1"/>
+              <a:t>verschillende</a:t>
+            </a:r>
+            <a:r>
+              <a:rPr lang="en-BE" dirty="0"/>
+              <a:t> </a:t>
+            </a:r>
+            <a:r>
+              <a:rPr lang="en-BE" dirty="0" err="1"/>
+              <a:t>platformen</a:t>
+            </a:r>
             <a:endParaRPr lang="en-BE" dirty="0"/>
           </a:p>
           <a:p>
@@ -5447,20 +5649,28 @@
             <p:ph type="ctrTitle"/>
           </p:nvPr>
         </p:nvSpPr>
-        <p:spPr/>
-        <p:txBody>
-          <a:bodyPr/>
+        <p:spPr>
+          <a:xfrm>
+            <a:off x="1524000" y="1541462"/>
+            <a:ext cx="9144000" cy="2387600"/>
+          </a:xfrm>
+        </p:spPr>
+        <p:txBody>
+          <a:bodyPr>
+            <a:normAutofit/>
+          </a:bodyPr>
           <a:lstStyle/>
           <a:p>
-            <a:r>
-              <a:rPr lang="en-BE" b="1" dirty="0" err="1">
+            <a:pPr algn="l"/>
+            <a:r>
+              <a:rPr lang="en-BE" sz="13600" b="1" dirty="0" err="1">
                 <a:solidFill>
                   <a:schemeClr val="bg1"/>
                 </a:solidFill>
               </a:rPr>
               <a:t>Einde</a:t>
             </a:r>
-            <a:endParaRPr lang="nl-BE" b="1" dirty="0">
+            <a:endParaRPr lang="nl-BE" sz="13600" b="1" dirty="0">
               <a:solidFill>
                 <a:schemeClr val="bg1"/>
               </a:solidFill>
@@ -5484,13 +5694,21 @@
             <p:ph type="subTitle" idx="1"/>
           </p:nvPr>
         </p:nvSpPr>
-        <p:spPr/>
-        <p:txBody>
-          <a:bodyPr/>
+        <p:spPr>
+          <a:xfrm>
+            <a:off x="1625179" y="3637270"/>
+            <a:ext cx="9144000" cy="1655762"/>
+          </a:xfrm>
+        </p:spPr>
+        <p:txBody>
+          <a:bodyPr>
+            <a:normAutofit/>
+          </a:bodyPr>
           <a:lstStyle/>
           <a:p>
-            <a:r>
-              <a:rPr lang="en-BE" dirty="0" err="1">
+            <a:pPr algn="l"/>
+            <a:r>
+              <a:rPr lang="en-BE" sz="4000" dirty="0" err="1">
                 <a:solidFill>
                   <a:schemeClr val="bg1"/>
                 </a:solidFill>
@@ -5498,7 +5716,7 @@
               <a:t>Zijn</a:t>
             </a:r>
             <a:r>
-              <a:rPr lang="en-BE" dirty="0">
+              <a:rPr lang="en-BE" sz="4000" dirty="0">
                 <a:solidFill>
                   <a:schemeClr val="bg1"/>
                 </a:solidFill>
@@ -5506,7 +5724,7 @@
               <a:t> er </a:t>
             </a:r>
             <a:r>
-              <a:rPr lang="en-BE" dirty="0" err="1">
+              <a:rPr lang="en-BE" sz="4000" dirty="0" err="1">
                 <a:solidFill>
                   <a:schemeClr val="bg1"/>
                 </a:solidFill>
@@ -5514,7 +5732,7 @@
               <a:t>nog</a:t>
             </a:r>
             <a:r>
-              <a:rPr lang="en-BE" dirty="0">
+              <a:rPr lang="en-BE" sz="4000" dirty="0">
                 <a:solidFill>
                   <a:schemeClr val="bg1"/>
                 </a:solidFill>
@@ -5522,7 +5740,7 @@
               <a:t> </a:t>
             </a:r>
             <a:r>
-              <a:rPr lang="en-BE" dirty="0" err="1">
+              <a:rPr lang="en-BE" sz="4000" dirty="0" err="1">
                 <a:solidFill>
                   <a:schemeClr val="bg1"/>
                 </a:solidFill>
@@ -5530,14 +5748,14 @@
               <a:t>vragen</a:t>
             </a:r>
             <a:r>
-              <a:rPr lang="en-BE" dirty="0">
+              <a:rPr lang="en-BE" sz="4000" dirty="0">
                 <a:solidFill>
                   <a:schemeClr val="bg1"/>
                 </a:solidFill>
               </a:rPr>
               <a:t>?</a:t>
             </a:r>
-            <a:endParaRPr lang="nl-BE" dirty="0">
+            <a:endParaRPr lang="nl-BE" sz="4000" dirty="0">
               <a:solidFill>
                 <a:schemeClr val="bg1"/>
               </a:solidFill>
@@ -5545,6 +5763,42 @@
           </a:p>
         </p:txBody>
       </p:sp>
+      <p:pic>
+        <p:nvPicPr>
+          <p:cNvPr id="7" name="Afbeelding 6" descr="Afbeelding met tekening, schets, clipart, illustratie&#10;&#10;Automatisch gegenereerde beschrijving">
+            <a:extLst>
+              <a:ext uri="{FF2B5EF4-FFF2-40B4-BE49-F238E27FC236}">
+                <a16:creationId xmlns:a16="http://schemas.microsoft.com/office/drawing/2014/main" id="{404EFF37-BB63-2AA1-EDCD-4C55695126EB}"/>
+              </a:ext>
+            </a:extLst>
+          </p:cNvPr>
+          <p:cNvPicPr>
+            <a:picLocks noChangeAspect="1"/>
+          </p:cNvPicPr>
+          <p:nvPr/>
+        </p:nvPicPr>
+        <p:blipFill>
+          <a:blip r:embed="rId4">
+            <a:extLst>
+              <a:ext uri="{28A0092B-C50C-407E-A947-70E740481C1C}">
+                <a14:useLocalDpi xmlns:a14="http://schemas.microsoft.com/office/drawing/2010/main" val="0"/>
+              </a:ext>
+            </a:extLst>
+          </a:blip>
+          <a:stretch>
+            <a:fillRect/>
+          </a:stretch>
+        </p:blipFill>
+        <p:spPr>
+          <a:xfrm>
+            <a:off x="6331975" y="1541462"/>
+            <a:ext cx="4538382" cy="3429000"/>
+          </a:xfrm>
+          <a:prstGeom prst="rect">
+            <a:avLst/>
+          </a:prstGeom>
+        </p:spPr>
+      </p:pic>
     </p:spTree>
     <p:extLst>
       <p:ext uri="{BB962C8B-B14F-4D97-AF65-F5344CB8AC3E}">
@@ -5555,6 +5809,9 @@
   <p:clrMapOvr>
     <a:masterClrMapping/>
   </p:clrMapOvr>
+  <p:transition spd="slow">
+    <p:push dir="u"/>
+  </p:transition>
 </p:sld>
 </file>
 
@@ -6073,6 +6330,42 @@
           </a:p>
         </p:txBody>
       </p:sp>
+      <p:pic>
+        <p:nvPicPr>
+          <p:cNvPr id="4" name="Afbeelding 3" descr="Afbeelding met clipart, illustratie, Tekenfilm, tekenfilm&#10;&#10;Automatisch gegenereerde beschrijving">
+            <a:extLst>
+              <a:ext uri="{FF2B5EF4-FFF2-40B4-BE49-F238E27FC236}">
+                <a16:creationId xmlns:a16="http://schemas.microsoft.com/office/drawing/2014/main" id="{8E21E572-5724-DC1B-1B36-EF1C22952F01}"/>
+              </a:ext>
+            </a:extLst>
+          </p:cNvPr>
+          <p:cNvPicPr>
+            <a:picLocks noChangeAspect="1"/>
+          </p:cNvPicPr>
+          <p:nvPr/>
+        </p:nvPicPr>
+        <p:blipFill>
+          <a:blip r:embed="rId4">
+            <a:extLst>
+              <a:ext uri="{28A0092B-C50C-407E-A947-70E740481C1C}">
+                <a14:useLocalDpi xmlns:a14="http://schemas.microsoft.com/office/drawing/2010/main" val="0"/>
+              </a:ext>
+            </a:extLst>
+          </a:blip>
+          <a:stretch>
+            <a:fillRect/>
+          </a:stretch>
+        </p:blipFill>
+        <p:spPr>
+          <a:xfrm>
+            <a:off x="7039897" y="3136670"/>
+            <a:ext cx="2558845" cy="3480030"/>
+          </a:xfrm>
+          <a:prstGeom prst="rect">
+            <a:avLst/>
+          </a:prstGeom>
+        </p:spPr>
+      </p:pic>
     </p:spTree>
     <p:extLst>
       <p:ext uri="{BB962C8B-B14F-4D97-AF65-F5344CB8AC3E}">
@@ -7948,6 +8241,42 @@
           </a:p>
         </p:txBody>
       </p:sp>
+      <p:pic>
+        <p:nvPicPr>
+          <p:cNvPr id="6" name="Afbeelding 5" descr="Afbeelding met clipart, uil, illustratie, Tekenfilm&#10;&#10;Automatisch gegenereerde beschrijving">
+            <a:extLst>
+              <a:ext uri="{FF2B5EF4-FFF2-40B4-BE49-F238E27FC236}">
+                <a16:creationId xmlns:a16="http://schemas.microsoft.com/office/drawing/2014/main" id="{E2151104-BB07-A85A-74F1-7BCC46EE07CE}"/>
+              </a:ext>
+            </a:extLst>
+          </p:cNvPr>
+          <p:cNvPicPr>
+            <a:picLocks noChangeAspect="1"/>
+          </p:cNvPicPr>
+          <p:nvPr/>
+        </p:nvPicPr>
+        <p:blipFill>
+          <a:blip r:embed="rId4">
+            <a:extLst>
+              <a:ext uri="{28A0092B-C50C-407E-A947-70E740481C1C}">
+                <a14:useLocalDpi xmlns:a14="http://schemas.microsoft.com/office/drawing/2010/main" val="0"/>
+              </a:ext>
+            </a:extLst>
+          </a:blip>
+          <a:stretch>
+            <a:fillRect/>
+          </a:stretch>
+        </p:blipFill>
+        <p:spPr>
+          <a:xfrm>
+            <a:off x="7177548" y="1690688"/>
+            <a:ext cx="3416659" cy="4308983"/>
+          </a:xfrm>
+          <a:prstGeom prst="rect">
+            <a:avLst/>
+          </a:prstGeom>
+        </p:spPr>
+      </p:pic>
     </p:spTree>
     <p:extLst>
       <p:ext uri="{BB962C8B-B14F-4D97-AF65-F5344CB8AC3E}">

</xml_diff>